<commit_message>
updated poster with uml
</commit_message>
<xml_diff>
--- a/poster.pptx
+++ b/poster.pptx
@@ -288,7 +288,7 @@
           <a:p>
             <a:fld id="{6076E908-0716-444B-B980-98FC1FF8FE8F}" type="datetimeFigureOut">
               <a:rPr lang="en-US" smtClean="0"/>
-              <a:t>2/5/13</a:t>
+              <a:t>2/6/13</a:t>
             </a:fld>
             <a:endParaRPr lang="en-US"/>
           </a:p>
@@ -458,7 +458,7 @@
           <a:p>
             <a:fld id="{6076E908-0716-444B-B980-98FC1FF8FE8F}" type="datetimeFigureOut">
               <a:rPr lang="en-US" smtClean="0"/>
-              <a:t>2/5/13</a:t>
+              <a:t>2/6/13</a:t>
             </a:fld>
             <a:endParaRPr lang="en-US"/>
           </a:p>
@@ -638,7 +638,7 @@
           <a:p>
             <a:fld id="{6076E908-0716-444B-B980-98FC1FF8FE8F}" type="datetimeFigureOut">
               <a:rPr lang="en-US" smtClean="0"/>
-              <a:t>2/5/13</a:t>
+              <a:t>2/6/13</a:t>
             </a:fld>
             <a:endParaRPr lang="en-US"/>
           </a:p>
@@ -808,7 +808,7 @@
           <a:p>
             <a:fld id="{6076E908-0716-444B-B980-98FC1FF8FE8F}" type="datetimeFigureOut">
               <a:rPr lang="en-US" smtClean="0"/>
-              <a:t>2/5/13</a:t>
+              <a:t>2/6/13</a:t>
             </a:fld>
             <a:endParaRPr lang="en-US"/>
           </a:p>
@@ -1054,7 +1054,7 @@
           <a:p>
             <a:fld id="{6076E908-0716-444B-B980-98FC1FF8FE8F}" type="datetimeFigureOut">
               <a:rPr lang="en-US" smtClean="0"/>
-              <a:t>2/5/13</a:t>
+              <a:t>2/6/13</a:t>
             </a:fld>
             <a:endParaRPr lang="en-US"/>
           </a:p>
@@ -1342,7 +1342,7 @@
           <a:p>
             <a:fld id="{6076E908-0716-444B-B980-98FC1FF8FE8F}" type="datetimeFigureOut">
               <a:rPr lang="en-US" smtClean="0"/>
-              <a:t>2/5/13</a:t>
+              <a:t>2/6/13</a:t>
             </a:fld>
             <a:endParaRPr lang="en-US"/>
           </a:p>
@@ -1764,7 +1764,7 @@
           <a:p>
             <a:fld id="{6076E908-0716-444B-B980-98FC1FF8FE8F}" type="datetimeFigureOut">
               <a:rPr lang="en-US" smtClean="0"/>
-              <a:t>2/5/13</a:t>
+              <a:t>2/6/13</a:t>
             </a:fld>
             <a:endParaRPr lang="en-US"/>
           </a:p>
@@ -1882,7 +1882,7 @@
           <a:p>
             <a:fld id="{6076E908-0716-444B-B980-98FC1FF8FE8F}" type="datetimeFigureOut">
               <a:rPr lang="en-US" smtClean="0"/>
-              <a:t>2/5/13</a:t>
+              <a:t>2/6/13</a:t>
             </a:fld>
             <a:endParaRPr lang="en-US"/>
           </a:p>
@@ -1977,7 +1977,7 @@
           <a:p>
             <a:fld id="{6076E908-0716-444B-B980-98FC1FF8FE8F}" type="datetimeFigureOut">
               <a:rPr lang="en-US" smtClean="0"/>
-              <a:t>2/5/13</a:t>
+              <a:t>2/6/13</a:t>
             </a:fld>
             <a:endParaRPr lang="en-US"/>
           </a:p>
@@ -2254,7 +2254,7 @@
           <a:p>
             <a:fld id="{6076E908-0716-444B-B980-98FC1FF8FE8F}" type="datetimeFigureOut">
               <a:rPr lang="en-US" smtClean="0"/>
-              <a:t>2/5/13</a:t>
+              <a:t>2/6/13</a:t>
             </a:fld>
             <a:endParaRPr lang="en-US"/>
           </a:p>
@@ -2507,7 +2507,7 @@
           <a:p>
             <a:fld id="{6076E908-0716-444B-B980-98FC1FF8FE8F}" type="datetimeFigureOut">
               <a:rPr lang="en-US" smtClean="0"/>
-              <a:t>2/5/13</a:t>
+              <a:t>2/6/13</a:t>
             </a:fld>
             <a:endParaRPr lang="en-US"/>
           </a:p>
@@ -2720,7 +2720,7 @@
           <a:p>
             <a:fld id="{6076E908-0716-444B-B980-98FC1FF8FE8F}" type="datetimeFigureOut">
               <a:rPr lang="en-US" smtClean="0"/>
-              <a:t>2/5/13</a:t>
+              <a:t>2/6/13</a:t>
             </a:fld>
             <a:endParaRPr lang="en-US"/>
           </a:p>
@@ -3442,7 +3442,7 @@
         </p:blipFill>
         <p:spPr>
           <a:xfrm>
-            <a:off x="22759239" y="14396609"/>
+            <a:off x="20389193" y="14396609"/>
             <a:ext cx="4740092" cy="9197578"/>
           </a:xfrm>
           <a:prstGeom prst="rect">
@@ -3474,6 +3474,36 @@
           <a:xfrm>
             <a:off x="15471246" y="23594187"/>
             <a:ext cx="4720994" cy="9197578"/>
+          </a:xfrm>
+          <a:prstGeom prst="rect">
+            <a:avLst/>
+          </a:prstGeom>
+        </p:spPr>
+      </p:pic>
+      <p:pic>
+        <p:nvPicPr>
+          <p:cNvPr id="9" name="Picture 8" descr="uml%20presentation.png"/>
+          <p:cNvPicPr>
+            <a:picLocks noChangeAspect="1"/>
+          </p:cNvPicPr>
+          <p:nvPr/>
+        </p:nvPicPr>
+        <p:blipFill>
+          <a:blip r:embed="rId6">
+            <a:extLst>
+              <a:ext uri="{28A0092B-C50C-407E-A947-70E740481C1C}">
+                <a14:useLocalDpi xmlns:a14="http://schemas.microsoft.com/office/drawing/2010/main" val="0"/>
+              </a:ext>
+            </a:extLst>
+          </a:blip>
+          <a:stretch>
+            <a:fillRect/>
+          </a:stretch>
+        </p:blipFill>
+        <p:spPr>
+          <a:xfrm>
+            <a:off x="25266036" y="20865203"/>
+            <a:ext cx="17876032" cy="10952733"/>
           </a:xfrm>
           <a:prstGeom prst="rect">
             <a:avLst/>

</xml_diff>